<commit_message>
Update Fatec logo on presentation
</commit_message>
<xml_diff>
--- a/Docs/presentation/AViS_apresentacao_v4.pptx
+++ b/Docs/presentation/AViS_apresentacao_v4.pptx
@@ -216,7 +216,7 @@
           <a:p>
             <a:fld id="{5B133B87-D83F-463A-8769-31C58924C3E9}" type="datetimeFigureOut">
               <a:rPr lang="pt-BR" smtClean="0"/>
-              <a:t>21/11/2019</a:t>
+              <a:t>22/11/2019</a:t>
             </a:fld>
             <a:endParaRPr lang="pt-BR"/>
           </a:p>
@@ -1814,7 +1814,7 @@
           <a:p>
             <a:fld id="{94E658C2-CA2E-456B-BA1C-2BCFB6157F9B}" type="datetimeFigureOut">
               <a:rPr lang="pt-BR" smtClean="0"/>
-              <a:t>21/11/2019</a:t>
+              <a:t>22/11/2019</a:t>
             </a:fld>
             <a:endParaRPr lang="pt-BR"/>
           </a:p>
@@ -2012,7 +2012,7 @@
           <a:p>
             <a:fld id="{94E658C2-CA2E-456B-BA1C-2BCFB6157F9B}" type="datetimeFigureOut">
               <a:rPr lang="pt-BR" smtClean="0"/>
-              <a:t>21/11/2019</a:t>
+              <a:t>22/11/2019</a:t>
             </a:fld>
             <a:endParaRPr lang="pt-BR"/>
           </a:p>
@@ -2220,7 +2220,7 @@
           <a:p>
             <a:fld id="{94E658C2-CA2E-456B-BA1C-2BCFB6157F9B}" type="datetimeFigureOut">
               <a:rPr lang="pt-BR" smtClean="0"/>
-              <a:t>21/11/2019</a:t>
+              <a:t>22/11/2019</a:t>
             </a:fld>
             <a:endParaRPr lang="pt-BR"/>
           </a:p>
@@ -2418,7 +2418,7 @@
           <a:p>
             <a:fld id="{94E658C2-CA2E-456B-BA1C-2BCFB6157F9B}" type="datetimeFigureOut">
               <a:rPr lang="pt-BR" smtClean="0"/>
-              <a:t>21/11/2019</a:t>
+              <a:t>22/11/2019</a:t>
             </a:fld>
             <a:endParaRPr lang="pt-BR"/>
           </a:p>
@@ -2693,7 +2693,7 @@
           <a:p>
             <a:fld id="{94E658C2-CA2E-456B-BA1C-2BCFB6157F9B}" type="datetimeFigureOut">
               <a:rPr lang="pt-BR" smtClean="0"/>
-              <a:t>21/11/2019</a:t>
+              <a:t>22/11/2019</a:t>
             </a:fld>
             <a:endParaRPr lang="pt-BR"/>
           </a:p>
@@ -2958,7 +2958,7 @@
           <a:p>
             <a:fld id="{94E658C2-CA2E-456B-BA1C-2BCFB6157F9B}" type="datetimeFigureOut">
               <a:rPr lang="pt-BR" smtClean="0"/>
-              <a:t>21/11/2019</a:t>
+              <a:t>22/11/2019</a:t>
             </a:fld>
             <a:endParaRPr lang="pt-BR"/>
           </a:p>
@@ -3370,7 +3370,7 @@
           <a:p>
             <a:fld id="{94E658C2-CA2E-456B-BA1C-2BCFB6157F9B}" type="datetimeFigureOut">
               <a:rPr lang="pt-BR" smtClean="0"/>
-              <a:t>21/11/2019</a:t>
+              <a:t>22/11/2019</a:t>
             </a:fld>
             <a:endParaRPr lang="pt-BR"/>
           </a:p>
@@ -3511,7 +3511,7 @@
           <a:p>
             <a:fld id="{94E658C2-CA2E-456B-BA1C-2BCFB6157F9B}" type="datetimeFigureOut">
               <a:rPr lang="pt-BR" smtClean="0"/>
-              <a:t>21/11/2019</a:t>
+              <a:t>22/11/2019</a:t>
             </a:fld>
             <a:endParaRPr lang="pt-BR"/>
           </a:p>
@@ -3624,7 +3624,7 @@
           <a:p>
             <a:fld id="{94E658C2-CA2E-456B-BA1C-2BCFB6157F9B}" type="datetimeFigureOut">
               <a:rPr lang="pt-BR" smtClean="0"/>
-              <a:t>21/11/2019</a:t>
+              <a:t>22/11/2019</a:t>
             </a:fld>
             <a:endParaRPr lang="pt-BR"/>
           </a:p>
@@ -3935,7 +3935,7 @@
           <a:p>
             <a:fld id="{94E658C2-CA2E-456B-BA1C-2BCFB6157F9B}" type="datetimeFigureOut">
               <a:rPr lang="pt-BR" smtClean="0"/>
-              <a:t>21/11/2019</a:t>
+              <a:t>22/11/2019</a:t>
             </a:fld>
             <a:endParaRPr lang="pt-BR"/>
           </a:p>
@@ -4223,7 +4223,7 @@
           <a:p>
             <a:fld id="{94E658C2-CA2E-456B-BA1C-2BCFB6157F9B}" type="datetimeFigureOut">
               <a:rPr lang="pt-BR" smtClean="0"/>
-              <a:t>21/11/2019</a:t>
+              <a:t>22/11/2019</a:t>
             </a:fld>
             <a:endParaRPr lang="pt-BR"/>
           </a:p>
@@ -4464,7 +4464,7 @@
           <a:p>
             <a:fld id="{94E658C2-CA2E-456B-BA1C-2BCFB6157F9B}" type="datetimeFigureOut">
               <a:rPr lang="pt-BR" smtClean="0"/>
-              <a:t>21/11/2019</a:t>
+              <a:t>22/11/2019</a:t>
             </a:fld>
             <a:endParaRPr lang="pt-BR"/>
           </a:p>
@@ -4883,10 +4883,10 @@
       </p:grpSpPr>
       <p:pic>
         <p:nvPicPr>
-          <p:cNvPr id="3" name="Imagem 2" descr="Tela de celular com texto preto sobre fundo branco&#10;&#10;Descrição gerada automaticamente">
-            <a:extLst>
-              <a:ext uri="{FF2B5EF4-FFF2-40B4-BE49-F238E27FC236}">
-                <a16:creationId xmlns:a16="http://schemas.microsoft.com/office/drawing/2014/main" id="{D6D9D044-B1C9-475C-A787-936EE2C672BE}"/>
+          <p:cNvPr id="4" name="Imagem 3" descr="Tela de celular com texto preto sobre fundo branco&#10;&#10;Descrição gerada automaticamente">
+            <a:extLst>
+              <a:ext uri="{FF2B5EF4-FFF2-40B4-BE49-F238E27FC236}">
+                <a16:creationId xmlns:a16="http://schemas.microsoft.com/office/drawing/2014/main" id="{0C343137-81B6-47B8-95B1-F4CE68298955}"/>
               </a:ext>
             </a:extLst>
           </p:cNvPr>
@@ -5873,10 +5873,10 @@
       </p:grpSpPr>
       <p:pic>
         <p:nvPicPr>
-          <p:cNvPr id="4" name="Imagem 3" descr="Tela de celular com texto preto sobre fundo branco&#10;&#10;Descrição gerada automaticamente">
-            <a:extLst>
-              <a:ext uri="{FF2B5EF4-FFF2-40B4-BE49-F238E27FC236}">
-                <a16:creationId xmlns:a16="http://schemas.microsoft.com/office/drawing/2014/main" id="{93F064F3-EA27-4F8D-B305-4326FCBD783E}"/>
+          <p:cNvPr id="3" name="Imagem 2" descr="Tela de celular com texto preto sobre fundo branco&#10;&#10;Descrição gerada automaticamente">
+            <a:extLst>
+              <a:ext uri="{FF2B5EF4-FFF2-40B4-BE49-F238E27FC236}">
+                <a16:creationId xmlns:a16="http://schemas.microsoft.com/office/drawing/2014/main" id="{2F6AAA12-21F0-45C2-B1F3-45FD53BBCBB2}"/>
               </a:ext>
             </a:extLst>
           </p:cNvPr>

</xml_diff>